<commit_message>
Upadated local neighborhood slides.
</commit_message>
<xml_diff>
--- a/CAP6675_HW2_Presentation.pptx
+++ b/CAP6675_HW2_Presentation.pptx
@@ -112,6 +112,726 @@
     </a:lvl9pPr>
   </p:defaultTextStyle>
 </p:presentation>
+</file>
+
+<file path=ppt/charts/chart1.xml><?xml version="1.0" encoding="utf-8"?>
+<c:chartSpace xmlns:c="http://schemas.openxmlformats.org/drawingml/2006/chart" xmlns:a="http://schemas.openxmlformats.org/drawingml/2006/main" xmlns:r="http://schemas.openxmlformats.org/officeDocument/2006/relationships">
+  <c:date1904 val="1"/>
+  <c:lang val="en-US"/>
+  <c:roundedCorners val="0"/>
+  <mc:AlternateContent xmlns:mc="http://schemas.openxmlformats.org/markup-compatibility/2006">
+    <mc:Choice xmlns:c14="http://schemas.microsoft.com/office/drawing/2007/8/2/chart" Requires="c14">
+      <c14:style val="118"/>
+    </mc:Choice>
+    <mc:Fallback>
+      <c:style val="18"/>
+    </mc:Fallback>
+  </mc:AlternateContent>
+  <c:chart>
+    <c:autoTitleDeleted val="0"/>
+    <c:plotArea>
+      <c:layout/>
+      <c:lineChart>
+        <c:grouping val="standard"/>
+        <c:varyColors val="0"/>
+        <c:ser>
+          <c:idx val="1"/>
+          <c:order val="0"/>
+          <c:tx>
+            <c:v>percent-similar</c:v>
+          </c:tx>
+          <c:marker>
+            <c:symbol val="none"/>
+          </c:marker>
+          <c:cat>
+            <c:numRef>
+              <c:f>Sheet1!$N$3:$N$23</c:f>
+              <c:numCache>
+                <c:formatCode>General</c:formatCode>
+                <c:ptCount val="21"/>
+                <c:pt idx="0">
+                  <c:v>0.0</c:v>
+                </c:pt>
+                <c:pt idx="1">
+                  <c:v>5.0</c:v>
+                </c:pt>
+                <c:pt idx="2">
+                  <c:v>10.0</c:v>
+                </c:pt>
+                <c:pt idx="3">
+                  <c:v>15.0</c:v>
+                </c:pt>
+                <c:pt idx="4">
+                  <c:v>20.0</c:v>
+                </c:pt>
+                <c:pt idx="5">
+                  <c:v>25.0</c:v>
+                </c:pt>
+                <c:pt idx="6">
+                  <c:v>30.0</c:v>
+                </c:pt>
+                <c:pt idx="7">
+                  <c:v>35.0</c:v>
+                </c:pt>
+                <c:pt idx="8">
+                  <c:v>40.0</c:v>
+                </c:pt>
+                <c:pt idx="9">
+                  <c:v>45.0</c:v>
+                </c:pt>
+                <c:pt idx="10">
+                  <c:v>50.0</c:v>
+                </c:pt>
+                <c:pt idx="11">
+                  <c:v>55.0</c:v>
+                </c:pt>
+                <c:pt idx="12">
+                  <c:v>60.0</c:v>
+                </c:pt>
+                <c:pt idx="13">
+                  <c:v>65.0</c:v>
+                </c:pt>
+                <c:pt idx="14">
+                  <c:v>70.0</c:v>
+                </c:pt>
+                <c:pt idx="15">
+                  <c:v>75.0</c:v>
+                </c:pt>
+                <c:pt idx="16">
+                  <c:v>80.0</c:v>
+                </c:pt>
+                <c:pt idx="17">
+                  <c:v>85.0</c:v>
+                </c:pt>
+                <c:pt idx="18">
+                  <c:v>90.0</c:v>
+                </c:pt>
+                <c:pt idx="19">
+                  <c:v>95.0</c:v>
+                </c:pt>
+                <c:pt idx="20">
+                  <c:v>100.0</c:v>
+                </c:pt>
+              </c:numCache>
+            </c:numRef>
+          </c:cat>
+          <c:val>
+            <c:numRef>
+              <c:f>Sheet1!$O$3:$O$23</c:f>
+              <c:numCache>
+                <c:formatCode>General</c:formatCode>
+                <c:ptCount val="21"/>
+                <c:pt idx="0">
+                  <c:v>80.19210002563977</c:v>
+                </c:pt>
+                <c:pt idx="1">
+                  <c:v>85.11285232942976</c:v>
+                </c:pt>
+                <c:pt idx="2">
+                  <c:v>84.91545814691288</c:v>
+                </c:pt>
+                <c:pt idx="3">
+                  <c:v>88.54140493220702</c:v>
+                </c:pt>
+                <c:pt idx="4">
+                  <c:v>89.2747559027257</c:v>
+                </c:pt>
+                <c:pt idx="5">
+                  <c:v>89.81423933100563</c:v>
+                </c:pt>
+                <c:pt idx="6">
+                  <c:v>92.13702556556577</c:v>
+                </c:pt>
+                <c:pt idx="7">
+                  <c:v>92.92244994103245</c:v>
+                </c:pt>
+                <c:pt idx="8">
+                  <c:v>94.18008929555465</c:v>
+                </c:pt>
+                <c:pt idx="9">
+                  <c:v>95.457617229929</c:v>
+                </c:pt>
+                <c:pt idx="10">
+                  <c:v>95.51548354894366</c:v>
+                </c:pt>
+                <c:pt idx="11">
+                  <c:v>97.22333007274116</c:v>
+                </c:pt>
+                <c:pt idx="12">
+                  <c:v>97.63467904331918</c:v>
+                </c:pt>
+                <c:pt idx="13">
+                  <c:v>98.20510272849842</c:v>
+                </c:pt>
+                <c:pt idx="14">
+                  <c:v>98.93786531251371</c:v>
+                </c:pt>
+                <c:pt idx="15">
+                  <c:v>99.31417556488821</c:v>
+                </c:pt>
+                <c:pt idx="16">
+                  <c:v>99.65650090984233</c:v>
+                </c:pt>
+                <c:pt idx="17">
+                  <c:v>91.01109929063072</c:v>
+                </c:pt>
+                <c:pt idx="18">
+                  <c:v>71.3424935476028</c:v>
+                </c:pt>
+                <c:pt idx="19">
+                  <c:v>71.19979473850648</c:v>
+                </c:pt>
+                <c:pt idx="20">
+                  <c:v>70.64574966767663</c:v>
+                </c:pt>
+              </c:numCache>
+            </c:numRef>
+          </c:val>
+          <c:smooth val="0"/>
+        </c:ser>
+        <c:ser>
+          <c:idx val="0"/>
+          <c:order val="1"/>
+          <c:tx>
+            <c:v>percent-unhappy</c:v>
+          </c:tx>
+          <c:marker>
+            <c:symbol val="none"/>
+          </c:marker>
+          <c:cat>
+            <c:numRef>
+              <c:f>Sheet1!$N$3:$N$23</c:f>
+              <c:numCache>
+                <c:formatCode>General</c:formatCode>
+                <c:ptCount val="21"/>
+                <c:pt idx="0">
+                  <c:v>0.0</c:v>
+                </c:pt>
+                <c:pt idx="1">
+                  <c:v>5.0</c:v>
+                </c:pt>
+                <c:pt idx="2">
+                  <c:v>10.0</c:v>
+                </c:pt>
+                <c:pt idx="3">
+                  <c:v>15.0</c:v>
+                </c:pt>
+                <c:pt idx="4">
+                  <c:v>20.0</c:v>
+                </c:pt>
+                <c:pt idx="5">
+                  <c:v>25.0</c:v>
+                </c:pt>
+                <c:pt idx="6">
+                  <c:v>30.0</c:v>
+                </c:pt>
+                <c:pt idx="7">
+                  <c:v>35.0</c:v>
+                </c:pt>
+                <c:pt idx="8">
+                  <c:v>40.0</c:v>
+                </c:pt>
+                <c:pt idx="9">
+                  <c:v>45.0</c:v>
+                </c:pt>
+                <c:pt idx="10">
+                  <c:v>50.0</c:v>
+                </c:pt>
+                <c:pt idx="11">
+                  <c:v>55.0</c:v>
+                </c:pt>
+                <c:pt idx="12">
+                  <c:v>60.0</c:v>
+                </c:pt>
+                <c:pt idx="13">
+                  <c:v>65.0</c:v>
+                </c:pt>
+                <c:pt idx="14">
+                  <c:v>70.0</c:v>
+                </c:pt>
+                <c:pt idx="15">
+                  <c:v>75.0</c:v>
+                </c:pt>
+                <c:pt idx="16">
+                  <c:v>80.0</c:v>
+                </c:pt>
+                <c:pt idx="17">
+                  <c:v>85.0</c:v>
+                </c:pt>
+                <c:pt idx="18">
+                  <c:v>90.0</c:v>
+                </c:pt>
+                <c:pt idx="19">
+                  <c:v>95.0</c:v>
+                </c:pt>
+                <c:pt idx="20">
+                  <c:v>100.0</c:v>
+                </c:pt>
+              </c:numCache>
+            </c:numRef>
+          </c:cat>
+          <c:val>
+            <c:numRef>
+              <c:f>Sheet1!$Q$3:$Q$23</c:f>
+              <c:numCache>
+                <c:formatCode>General</c:formatCode>
+                <c:ptCount val="21"/>
+                <c:pt idx="0">
+                  <c:v>0.23550724637681</c:v>
+                </c:pt>
+                <c:pt idx="1">
+                  <c:v>0.0</c:v>
+                </c:pt>
+                <c:pt idx="2">
+                  <c:v>0.0</c:v>
+                </c:pt>
+                <c:pt idx="3">
+                  <c:v>0.0</c:v>
+                </c:pt>
+                <c:pt idx="4">
+                  <c:v>0.0</c:v>
+                </c:pt>
+                <c:pt idx="5">
+                  <c:v>0.0</c:v>
+                </c:pt>
+                <c:pt idx="6">
+                  <c:v>0.0</c:v>
+                </c:pt>
+                <c:pt idx="7">
+                  <c:v>0.0</c:v>
+                </c:pt>
+                <c:pt idx="8">
+                  <c:v>0.0</c:v>
+                </c:pt>
+                <c:pt idx="9">
+                  <c:v>0.0</c:v>
+                </c:pt>
+                <c:pt idx="10">
+                  <c:v>0.0</c:v>
+                </c:pt>
+                <c:pt idx="11">
+                  <c:v>0.0</c:v>
+                </c:pt>
+                <c:pt idx="12">
+                  <c:v>0.0</c:v>
+                </c:pt>
+                <c:pt idx="13">
+                  <c:v>0.0</c:v>
+                </c:pt>
+                <c:pt idx="14">
+                  <c:v>0.0</c:v>
+                </c:pt>
+                <c:pt idx="15">
+                  <c:v>0.0</c:v>
+                </c:pt>
+                <c:pt idx="16">
+                  <c:v>0.0</c:v>
+                </c:pt>
+                <c:pt idx="17">
+                  <c:v>19.76545714880294</c:v>
+                </c:pt>
+                <c:pt idx="18">
+                  <c:v>52.86366142502554</c:v>
+                </c:pt>
+                <c:pt idx="19">
+                  <c:v>52.75382843542117</c:v>
+                </c:pt>
+                <c:pt idx="20">
+                  <c:v>53.7688644734769</c:v>
+                </c:pt>
+              </c:numCache>
+            </c:numRef>
+          </c:val>
+          <c:smooth val="0"/>
+        </c:ser>
+        <c:dLbls>
+          <c:showLegendKey val="0"/>
+          <c:showVal val="0"/>
+          <c:showCatName val="0"/>
+          <c:showSerName val="0"/>
+          <c:showPercent val="0"/>
+          <c:showBubbleSize val="0"/>
+        </c:dLbls>
+        <c:marker val="1"/>
+        <c:smooth val="0"/>
+        <c:axId val="434484424"/>
+        <c:axId val="434490072"/>
+      </c:lineChart>
+      <c:catAx>
+        <c:axId val="434484424"/>
+        <c:scaling>
+          <c:orientation val="minMax"/>
+        </c:scaling>
+        <c:delete val="0"/>
+        <c:axPos val="b"/>
+        <c:title>
+          <c:tx>
+            <c:rich>
+              <a:bodyPr/>
+              <a:lstStyle/>
+              <a:p>
+                <a:pPr>
+                  <a:defRPr/>
+                </a:pPr>
+                <a:r>
+                  <a:rPr lang="en-US" sz="1400"/>
+                  <a:t>Young % Similar</a:t>
+                </a:r>
+                <a:r>
+                  <a:rPr lang="en-US" sz="1400" baseline="0"/>
+                  <a:t> Wanted</a:t>
+                </a:r>
+              </a:p>
+            </c:rich>
+          </c:tx>
+          <c:layout/>
+          <c:overlay val="0"/>
+        </c:title>
+        <c:numFmt formatCode="General" sourceLinked="1"/>
+        <c:majorTickMark val="out"/>
+        <c:minorTickMark val="none"/>
+        <c:tickLblPos val="nextTo"/>
+        <c:crossAx val="434490072"/>
+        <c:crosses val="autoZero"/>
+        <c:auto val="1"/>
+        <c:lblAlgn val="ctr"/>
+        <c:lblOffset val="100"/>
+        <c:noMultiLvlLbl val="0"/>
+      </c:catAx>
+      <c:valAx>
+        <c:axId val="434490072"/>
+        <c:scaling>
+          <c:orientation val="minMax"/>
+        </c:scaling>
+        <c:delete val="0"/>
+        <c:axPos val="l"/>
+        <c:majorGridlines/>
+        <c:title>
+          <c:tx>
+            <c:rich>
+              <a:bodyPr rot="0" vert="horz"/>
+              <a:lstStyle/>
+              <a:p>
+                <a:pPr>
+                  <a:defRPr/>
+                </a:pPr>
+                <a:r>
+                  <a:rPr lang="en-US"/>
+                  <a:t>%</a:t>
+                </a:r>
+              </a:p>
+            </c:rich>
+          </c:tx>
+          <c:layout/>
+          <c:overlay val="0"/>
+        </c:title>
+        <c:numFmt formatCode="General" sourceLinked="1"/>
+        <c:majorTickMark val="out"/>
+        <c:minorTickMark val="none"/>
+        <c:tickLblPos val="nextTo"/>
+        <c:crossAx val="434484424"/>
+        <c:crosses val="autoZero"/>
+        <c:crossBetween val="between"/>
+      </c:valAx>
+    </c:plotArea>
+    <c:legend>
+      <c:legendPos val="r"/>
+      <c:layout/>
+      <c:overlay val="0"/>
+    </c:legend>
+    <c:plotVisOnly val="1"/>
+    <c:dispBlanksAs val="gap"/>
+    <c:showDLblsOverMax val="0"/>
+  </c:chart>
+  <c:externalData r:id="rId1">
+    <c:autoUpdate val="0"/>
+  </c:externalData>
+</c:chartSpace>
+</file>
+
+<file path=ppt/charts/chart2.xml><?xml version="1.0" encoding="utf-8"?>
+<c:chartSpace xmlns:c="http://schemas.openxmlformats.org/drawingml/2006/chart" xmlns:a="http://schemas.openxmlformats.org/drawingml/2006/main" xmlns:r="http://schemas.openxmlformats.org/officeDocument/2006/relationships">
+  <c:date1904 val="1"/>
+  <c:lang val="en-US"/>
+  <c:roundedCorners val="0"/>
+  <mc:AlternateContent xmlns:mc="http://schemas.openxmlformats.org/markup-compatibility/2006">
+    <mc:Choice xmlns:c14="http://schemas.microsoft.com/office/drawing/2007/8/2/chart" Requires="c14">
+      <c14:style val="118"/>
+    </mc:Choice>
+    <mc:Fallback>
+      <c:style val="18"/>
+    </mc:Fallback>
+  </mc:AlternateContent>
+  <c:chart>
+    <c:title>
+      <c:layout/>
+      <c:overlay val="0"/>
+    </c:title>
+    <c:autoTitleDeleted val="0"/>
+    <c:plotArea>
+      <c:layout/>
+      <c:lineChart>
+        <c:grouping val="standard"/>
+        <c:varyColors val="0"/>
+        <c:ser>
+          <c:idx val="0"/>
+          <c:order val="0"/>
+          <c:tx>
+            <c:v>Ticks</c:v>
+          </c:tx>
+          <c:marker>
+            <c:symbol val="none"/>
+          </c:marker>
+          <c:cat>
+            <c:numRef>
+              <c:f>Sheet1!$N$3:$N$23</c:f>
+              <c:numCache>
+                <c:formatCode>General</c:formatCode>
+                <c:ptCount val="21"/>
+                <c:pt idx="0">
+                  <c:v>0.0</c:v>
+                </c:pt>
+                <c:pt idx="1">
+                  <c:v>5.0</c:v>
+                </c:pt>
+                <c:pt idx="2">
+                  <c:v>10.0</c:v>
+                </c:pt>
+                <c:pt idx="3">
+                  <c:v>15.0</c:v>
+                </c:pt>
+                <c:pt idx="4">
+                  <c:v>20.0</c:v>
+                </c:pt>
+                <c:pt idx="5">
+                  <c:v>25.0</c:v>
+                </c:pt>
+                <c:pt idx="6">
+                  <c:v>30.0</c:v>
+                </c:pt>
+                <c:pt idx="7">
+                  <c:v>35.0</c:v>
+                </c:pt>
+                <c:pt idx="8">
+                  <c:v>40.0</c:v>
+                </c:pt>
+                <c:pt idx="9">
+                  <c:v>45.0</c:v>
+                </c:pt>
+                <c:pt idx="10">
+                  <c:v>50.0</c:v>
+                </c:pt>
+                <c:pt idx="11">
+                  <c:v>55.0</c:v>
+                </c:pt>
+                <c:pt idx="12">
+                  <c:v>60.0</c:v>
+                </c:pt>
+                <c:pt idx="13">
+                  <c:v>65.0</c:v>
+                </c:pt>
+                <c:pt idx="14">
+                  <c:v>70.0</c:v>
+                </c:pt>
+                <c:pt idx="15">
+                  <c:v>75.0</c:v>
+                </c:pt>
+                <c:pt idx="16">
+                  <c:v>80.0</c:v>
+                </c:pt>
+                <c:pt idx="17">
+                  <c:v>85.0</c:v>
+                </c:pt>
+                <c:pt idx="18">
+                  <c:v>90.0</c:v>
+                </c:pt>
+                <c:pt idx="19">
+                  <c:v>95.0</c:v>
+                </c:pt>
+                <c:pt idx="20">
+                  <c:v>100.0</c:v>
+                </c:pt>
+              </c:numCache>
+            </c:numRef>
+          </c:cat>
+          <c:val>
+            <c:numRef>
+              <c:f>Sheet1!$R$3:$R$23</c:f>
+              <c:numCache>
+                <c:formatCode>General</c:formatCode>
+                <c:ptCount val="21"/>
+                <c:pt idx="0">
+                  <c:v>546.4</c:v>
+                </c:pt>
+                <c:pt idx="1">
+                  <c:v>138.4</c:v>
+                </c:pt>
+                <c:pt idx="2">
+                  <c:v>117.2</c:v>
+                </c:pt>
+                <c:pt idx="3">
+                  <c:v>68.8</c:v>
+                </c:pt>
+                <c:pt idx="4">
+                  <c:v>80.4</c:v>
+                </c:pt>
+                <c:pt idx="5">
+                  <c:v>59.4</c:v>
+                </c:pt>
+                <c:pt idx="6">
+                  <c:v>50.6</c:v>
+                </c:pt>
+                <c:pt idx="7">
+                  <c:v>66.2</c:v>
+                </c:pt>
+                <c:pt idx="8">
+                  <c:v>63.0</c:v>
+                </c:pt>
+                <c:pt idx="9">
+                  <c:v>73.0</c:v>
+                </c:pt>
+                <c:pt idx="10">
+                  <c:v>68.2</c:v>
+                </c:pt>
+                <c:pt idx="11">
+                  <c:v>85.4</c:v>
+                </c:pt>
+                <c:pt idx="12">
+                  <c:v>65.0</c:v>
+                </c:pt>
+                <c:pt idx="13">
+                  <c:v>72.6</c:v>
+                </c:pt>
+                <c:pt idx="14">
+                  <c:v>105.6</c:v>
+                </c:pt>
+                <c:pt idx="15">
+                  <c:v>105.2</c:v>
+                </c:pt>
+                <c:pt idx="16">
+                  <c:v>134.8</c:v>
+                </c:pt>
+                <c:pt idx="17">
+                  <c:v>1000.0</c:v>
+                </c:pt>
+                <c:pt idx="18">
+                  <c:v>1000.0</c:v>
+                </c:pt>
+                <c:pt idx="19">
+                  <c:v>1000.0</c:v>
+                </c:pt>
+                <c:pt idx="20">
+                  <c:v>1000.0</c:v>
+                </c:pt>
+              </c:numCache>
+            </c:numRef>
+          </c:val>
+          <c:smooth val="0"/>
+        </c:ser>
+        <c:dLbls>
+          <c:showLegendKey val="0"/>
+          <c:showVal val="0"/>
+          <c:showCatName val="0"/>
+          <c:showSerName val="0"/>
+          <c:showPercent val="0"/>
+          <c:showBubbleSize val="0"/>
+        </c:dLbls>
+        <c:marker val="1"/>
+        <c:smooth val="0"/>
+        <c:axId val="436605880"/>
+        <c:axId val="436611624"/>
+      </c:lineChart>
+      <c:catAx>
+        <c:axId val="436605880"/>
+        <c:scaling>
+          <c:orientation val="minMax"/>
+        </c:scaling>
+        <c:delete val="0"/>
+        <c:axPos val="b"/>
+        <c:title>
+          <c:tx>
+            <c:rich>
+              <a:bodyPr/>
+              <a:lstStyle/>
+              <a:p>
+                <a:pPr>
+                  <a:defRPr/>
+                </a:pPr>
+                <a:r>
+                  <a:rPr lang="en-US" sz="1400" b="1" i="0" baseline="0">
+                    <a:effectLst/>
+                  </a:rPr>
+                  <a:t>Young % Similar Wanted</a:t>
+                </a:r>
+                <a:endParaRPr lang="en-US" sz="1400">
+                  <a:effectLst/>
+                </a:endParaRPr>
+              </a:p>
+            </c:rich>
+          </c:tx>
+          <c:layout/>
+          <c:overlay val="0"/>
+        </c:title>
+        <c:numFmt formatCode="General" sourceLinked="1"/>
+        <c:majorTickMark val="out"/>
+        <c:minorTickMark val="none"/>
+        <c:tickLblPos val="nextTo"/>
+        <c:crossAx val="436611624"/>
+        <c:crosses val="autoZero"/>
+        <c:auto val="1"/>
+        <c:lblAlgn val="ctr"/>
+        <c:lblOffset val="100"/>
+        <c:noMultiLvlLbl val="0"/>
+      </c:catAx>
+      <c:valAx>
+        <c:axId val="436611624"/>
+        <c:scaling>
+          <c:orientation val="minMax"/>
+        </c:scaling>
+        <c:delete val="0"/>
+        <c:axPos val="l"/>
+        <c:majorGridlines/>
+        <c:title>
+          <c:tx>
+            <c:rich>
+              <a:bodyPr rot="0" vert="horz"/>
+              <a:lstStyle/>
+              <a:p>
+                <a:pPr>
+                  <a:defRPr/>
+                </a:pPr>
+                <a:r>
+                  <a:rPr lang="en-US"/>
+                  <a:t>#</a:t>
+                </a:r>
+              </a:p>
+            </c:rich>
+          </c:tx>
+          <c:layout/>
+          <c:overlay val="0"/>
+        </c:title>
+        <c:numFmt formatCode="General" sourceLinked="1"/>
+        <c:majorTickMark val="out"/>
+        <c:minorTickMark val="none"/>
+        <c:tickLblPos val="nextTo"/>
+        <c:crossAx val="436605880"/>
+        <c:crosses val="autoZero"/>
+        <c:crossBetween val="between"/>
+      </c:valAx>
+    </c:plotArea>
+    <c:legend>
+      <c:legendPos val="r"/>
+      <c:layout/>
+      <c:overlay val="0"/>
+    </c:legend>
+    <c:plotVisOnly val="1"/>
+    <c:dispBlanksAs val="gap"/>
+    <c:showDLblsOverMax val="0"/>
+  </c:chart>
+  <c:externalData r:id="rId1">
+    <c:autoUpdate val="0"/>
+  </c:externalData>
+</c:chartSpace>
 </file>
 
 <file path=ppt/slideLayouts/slideLayout1.xml><?xml version="1.0" encoding="utf-8"?>
@@ -550,7 +1270,7 @@
           <a:p>
             <a:fld id="{7D290233-0DD1-4A80-BB1E-9ADC3556DBB6}" type="datetimeFigureOut">
               <a:rPr lang="en-US" smtClean="0"/>
-              <a:t>9/23/15</a:t>
+              <a:t>9/26/15</a:t>
             </a:fld>
             <a:endParaRPr lang="en-US"/>
           </a:p>
@@ -1161,7 +1881,7 @@
           <a:p>
             <a:fld id="{7D290233-0DD1-4A80-BB1E-9ADC3556DBB6}" type="datetimeFigureOut">
               <a:rPr lang="en-US" smtClean="0"/>
-              <a:t>9/23/15</a:t>
+              <a:t>9/26/15</a:t>
             </a:fld>
             <a:endParaRPr lang="en-US"/>
           </a:p>
@@ -1733,7 +2453,7 @@
           <a:p>
             <a:fld id="{7D290233-0DD1-4A80-BB1E-9ADC3556DBB6}" type="datetimeFigureOut">
               <a:rPr lang="en-US" smtClean="0"/>
-              <a:t>9/23/15</a:t>
+              <a:t>9/26/15</a:t>
             </a:fld>
             <a:endParaRPr lang="en-US"/>
           </a:p>
@@ -2267,7 +2987,7 @@
           <a:p>
             <a:fld id="{7D290233-0DD1-4A80-BB1E-9ADC3556DBB6}" type="datetimeFigureOut">
               <a:rPr lang="en-US" smtClean="0"/>
-              <a:t>9/23/15</a:t>
+              <a:t>9/26/15</a:t>
             </a:fld>
             <a:endParaRPr lang="en-US"/>
           </a:p>
@@ -2669,7 +3389,7 @@
           <a:p>
             <a:fld id="{7D290233-0DD1-4A80-BB1E-9ADC3556DBB6}" type="datetimeFigureOut">
               <a:rPr lang="en-US" smtClean="0"/>
-              <a:t>9/23/15</a:t>
+              <a:t>9/26/15</a:t>
             </a:fld>
             <a:endParaRPr lang="en-US"/>
           </a:p>
@@ -3102,7 +3822,7 @@
           <a:p>
             <a:fld id="{7D290233-0DD1-4A80-BB1E-9ADC3556DBB6}" type="datetimeFigureOut">
               <a:rPr lang="en-US" smtClean="0"/>
-              <a:t>9/23/15</a:t>
+              <a:t>9/26/15</a:t>
             </a:fld>
             <a:endParaRPr lang="en-US"/>
           </a:p>
@@ -3504,7 +4224,7 @@
           <a:p>
             <a:fld id="{7D290233-0DD1-4A80-BB1E-9ADC3556DBB6}" type="datetimeFigureOut">
               <a:rPr lang="en-US" smtClean="0"/>
-              <a:t>9/23/15</a:t>
+              <a:t>9/26/15</a:t>
             </a:fld>
             <a:endParaRPr lang="en-US"/>
           </a:p>
@@ -3978,7 +4698,7 @@
           <a:p>
             <a:fld id="{7D290233-0DD1-4A80-BB1E-9ADC3556DBB6}" type="datetimeFigureOut">
               <a:rPr lang="en-US" smtClean="0"/>
-              <a:t>9/23/15</a:t>
+              <a:t>9/26/15</a:t>
             </a:fld>
             <a:endParaRPr lang="en-US"/>
           </a:p>
@@ -4428,7 +5148,7 @@
           <a:p>
             <a:fld id="{7D290233-0DD1-4A80-BB1E-9ADC3556DBB6}" type="datetimeFigureOut">
               <a:rPr lang="en-US" smtClean="0"/>
-              <a:t>9/23/15</a:t>
+              <a:t>9/26/15</a:t>
             </a:fld>
             <a:endParaRPr lang="en-US"/>
           </a:p>
@@ -4948,7 +5668,7 @@
           <a:p>
             <a:fld id="{7D290233-0DD1-4A80-BB1E-9ADC3556DBB6}" type="datetimeFigureOut">
               <a:rPr lang="en-US" smtClean="0"/>
-              <a:t>9/23/15</a:t>
+              <a:t>9/26/15</a:t>
             </a:fld>
             <a:endParaRPr lang="en-US"/>
           </a:p>
@@ -5668,7 +6388,7 @@
           <a:p>
             <a:fld id="{7D290233-0DD1-4A80-BB1E-9ADC3556DBB6}" type="datetimeFigureOut">
               <a:rPr lang="en-US" smtClean="0"/>
-              <a:t>9/23/15</a:t>
+              <a:t>9/26/15</a:t>
             </a:fld>
             <a:endParaRPr lang="en-US"/>
           </a:p>
@@ -6014,7 +6734,7 @@
           <a:p>
             <a:fld id="{7D290233-0DD1-4A80-BB1E-9ADC3556DBB6}" type="datetimeFigureOut">
               <a:rPr lang="en-US" smtClean="0"/>
-              <a:t>9/23/15</a:t>
+              <a:t>9/26/15</a:t>
             </a:fld>
             <a:endParaRPr lang="en-US"/>
           </a:p>
@@ -6283,7 +7003,7 @@
           <a:p>
             <a:fld id="{7D290233-0DD1-4A80-BB1E-9ADC3556DBB6}" type="datetimeFigureOut">
               <a:rPr lang="en-US" smtClean="0"/>
-              <a:t>9/23/15</a:t>
+              <a:t>9/26/15</a:t>
             </a:fld>
             <a:endParaRPr lang="en-US"/>
           </a:p>
@@ -6840,7 +7560,7 @@
           <a:p>
             <a:fld id="{7D290233-0DD1-4A80-BB1E-9ADC3556DBB6}" type="datetimeFigureOut">
               <a:rPr lang="en-US" smtClean="0"/>
-              <a:t>9/23/15</a:t>
+              <a:t>9/26/15</a:t>
             </a:fld>
             <a:endParaRPr lang="en-US"/>
           </a:p>
@@ -7050,7 +7770,7 @@
           <a:p>
             <a:fld id="{7D290233-0DD1-4A80-BB1E-9ADC3556DBB6}" type="datetimeFigureOut">
               <a:rPr lang="en-US" smtClean="0"/>
-              <a:t>9/23/15</a:t>
+              <a:t>9/26/15</a:t>
             </a:fld>
             <a:endParaRPr lang="en-US"/>
           </a:p>
@@ -7983,32 +8703,120 @@
           </a:p>
         </p:txBody>
       </p:sp>
-      <p:sp>
-        <p:nvSpPr>
-          <p:cNvPr id="3" name="Content Placeholder 2"/>
-          <p:cNvSpPr>
-            <a:spLocks noGrp="1"/>
-          </p:cNvSpPr>
-          <p:nvPr>
-            <p:ph idx="1"/>
-          </p:nvPr>
+      <p:graphicFrame>
+        <p:nvGraphicFramePr>
+          <p:cNvPr id="4" name="Chart 3"/>
+          <p:cNvGraphicFramePr>
+            <a:graphicFrameLocks/>
+          </p:cNvGraphicFramePr>
+          <p:nvPr>
+            <p:extLst>
+              <p:ext uri="{D42A27DB-BD31-4B8C-83A1-F6EECF244321}">
+                <p14:modId xmlns:p14="http://schemas.microsoft.com/office/powerpoint/2010/main" val="812766261"/>
+              </p:ext>
+            </p:extLst>
+          </p:nvPr>
+        </p:nvGraphicFramePr>
+        <p:xfrm>
+          <a:off x="150175" y="3638598"/>
+          <a:ext cx="4572000" cy="2743200"/>
+        </p:xfrm>
+        <a:graphic>
+          <a:graphicData uri="http://schemas.openxmlformats.org/drawingml/2006/chart">
+            <c:chart xmlns:c="http://schemas.openxmlformats.org/drawingml/2006/chart" xmlns:r="http://schemas.openxmlformats.org/officeDocument/2006/relationships" r:id="rId2"/>
+          </a:graphicData>
+        </a:graphic>
+      </p:graphicFrame>
+      <p:graphicFrame>
+        <p:nvGraphicFramePr>
+          <p:cNvPr id="5" name="Chart 4"/>
+          <p:cNvGraphicFramePr>
+            <a:graphicFrameLocks/>
+          </p:cNvGraphicFramePr>
+          <p:nvPr>
+            <p:extLst>
+              <p:ext uri="{D42A27DB-BD31-4B8C-83A1-F6EECF244321}">
+                <p14:modId xmlns:p14="http://schemas.microsoft.com/office/powerpoint/2010/main" val="3507754249"/>
+              </p:ext>
+            </p:extLst>
+          </p:nvPr>
+        </p:nvGraphicFramePr>
+        <p:xfrm>
+          <a:off x="4427688" y="3638598"/>
+          <a:ext cx="4572000" cy="2743200"/>
+        </p:xfrm>
+        <a:graphic>
+          <a:graphicData uri="http://schemas.openxmlformats.org/drawingml/2006/chart">
+            <c:chart xmlns:c="http://schemas.openxmlformats.org/drawingml/2006/chart" xmlns:r="http://schemas.openxmlformats.org/officeDocument/2006/relationships" r:id="rId3"/>
+          </a:graphicData>
+        </a:graphic>
+      </p:graphicFrame>
+      <p:sp>
+        <p:nvSpPr>
+          <p:cNvPr id="6" name="TextBox 5"/>
+          <p:cNvSpPr txBox="1"/>
+          <p:nvPr/>
         </p:nvSpPr>
         <p:spPr>
           <a:xfrm>
-            <a:off x="375212" y="1789356"/>
-            <a:ext cx="8341262" cy="4458963"/>
+            <a:off x="600999" y="1919230"/>
+            <a:ext cx="3826689" cy="1477328"/>
           </a:xfrm>
+          <a:prstGeom prst="rect">
+            <a:avLst/>
+          </a:prstGeom>
+          <a:noFill/>
         </p:spPr>
         <p:txBody>
-          <a:bodyPr>
-            <a:normAutofit/>
+          <a:bodyPr wrap="none" rtlCol="0">
+            <a:spAutoFit/>
           </a:bodyPr>
           <a:lstStyle/>
           <a:p>
-            <a:pPr lvl="1">
-              <a:buFontTx/>
-              <a:buChar char="-"/>
+            <a:r>
+              <a:rPr lang="en-US" dirty="0" smtClean="0"/>
+              <a:t>Parameters:</a:t>
+            </a:r>
+          </a:p>
+          <a:p>
+            <a:pPr marL="285750" indent="-285750">
+              <a:buFont typeface="Arial"/>
+              <a:buChar char="•"/>
             </a:pPr>
+            <a:r>
+              <a:rPr lang="en-US" dirty="0" smtClean="0"/>
+              <a:t>60% Old</a:t>
+            </a:r>
+          </a:p>
+          <a:p>
+            <a:pPr marL="742950" lvl="1" indent="-285750">
+              <a:buFont typeface="Arial"/>
+              <a:buChar char="•"/>
+            </a:pPr>
+            <a:r>
+              <a:rPr lang="en-US" dirty="0" smtClean="0"/>
+              <a:t>% Similar Wanted = 65%</a:t>
+            </a:r>
+          </a:p>
+          <a:p>
+            <a:pPr marL="285750" indent="-285750">
+              <a:buFont typeface="Arial"/>
+              <a:buChar char="•"/>
+            </a:pPr>
+            <a:r>
+              <a:rPr lang="en-US" dirty="0" smtClean="0"/>
+              <a:t>40% Young</a:t>
+            </a:r>
+          </a:p>
+          <a:p>
+            <a:pPr marL="742950" lvl="1" indent="-285750">
+              <a:buFont typeface="Arial"/>
+              <a:buChar char="•"/>
+            </a:pPr>
+            <a:r>
+              <a:rPr lang="en-US" dirty="0" smtClean="0"/>
+              <a:t>% Similar Wanted = [0 5 100]</a:t>
+            </a:r>
             <a:endParaRPr lang="en-US" dirty="0"/>
           </a:p>
         </p:txBody>
@@ -8111,7 +8919,15 @@
             </a:pPr>
             <a:r>
               <a:rPr lang="en-US" dirty="0" smtClean="0"/>
-              <a:t>How do preferred locations affect the level of segregation within a community.</a:t>
+              <a:t>How </a:t>
+            </a:r>
+            <a:r>
+              <a:rPr lang="en-US" dirty="0" smtClean="0"/>
+              <a:t>does age affect </a:t>
+            </a:r>
+            <a:r>
+              <a:rPr lang="en-US" dirty="0" smtClean="0"/>
+              <a:t>the level of segregation within a community.</a:t>
             </a:r>
             <a:endParaRPr lang="en-US" dirty="0"/>
           </a:p>

</xml_diff>

<commit_message>
Changes to local model
density
</commit_message>
<xml_diff>
--- a/CAP6675_HW2_Presentation.pptx
+++ b/CAP6675_HW2_Presentation.pptx
@@ -116,17 +116,8 @@
 
 <file path=ppt/charts/chart1.xml><?xml version="1.0" encoding="utf-8"?>
 <c:chartSpace xmlns:c="http://schemas.openxmlformats.org/drawingml/2006/chart" xmlns:a="http://schemas.openxmlformats.org/drawingml/2006/main" xmlns:r="http://schemas.openxmlformats.org/officeDocument/2006/relationships">
-  <c:date1904 val="0"/>
   <c:lang val="en-US"/>
-  <c:roundedCorners val="0"/>
-  <mc:AlternateContent xmlns:mc="http://schemas.openxmlformats.org/markup-compatibility/2006">
-    <mc:Choice xmlns:c14="http://schemas.microsoft.com/office/drawing/2007/8/2/chart" Requires="c14">
-      <c14:style val="118"/>
-    </mc:Choice>
-    <mc:Fallback>
-      <c:style val="18"/>
-    </mc:Fallback>
-  </mc:AlternateContent>
+  <c:style val="18"/>
   <c:chart>
     <c:title>
       <c:tx>
@@ -150,14 +141,11 @@
         </c:rich>
       </c:tx>
       <c:layout/>
-      <c:overlay val="0"/>
     </c:title>
-    <c:autoTitleDeleted val="0"/>
     <c:plotArea>
       <c:layout/>
       <c:lineChart>
         <c:grouping val="standard"/>
-        <c:varyColors val="0"/>
         <c:ser>
           <c:idx val="1"/>
           <c:order val="0"/>
@@ -174,67 +162,67 @@
                 <c:formatCode>General</c:formatCode>
                 <c:ptCount val="21"/>
                 <c:pt idx="0">
-                  <c:v>0.0</c:v>
+                  <c:v>0</c:v>
                 </c:pt>
                 <c:pt idx="1">
-                  <c:v>5.0</c:v>
+                  <c:v>5</c:v>
                 </c:pt>
                 <c:pt idx="2">
-                  <c:v>10.0</c:v>
+                  <c:v>10</c:v>
                 </c:pt>
                 <c:pt idx="3">
-                  <c:v>15.0</c:v>
+                  <c:v>15</c:v>
                 </c:pt>
                 <c:pt idx="4">
-                  <c:v>20.0</c:v>
+                  <c:v>20</c:v>
                 </c:pt>
                 <c:pt idx="5">
-                  <c:v>25.0</c:v>
+                  <c:v>25</c:v>
                 </c:pt>
                 <c:pt idx="6">
-                  <c:v>30.0</c:v>
+                  <c:v>30</c:v>
                 </c:pt>
                 <c:pt idx="7">
-                  <c:v>35.0</c:v>
+                  <c:v>35</c:v>
                 </c:pt>
                 <c:pt idx="8">
-                  <c:v>40.0</c:v>
+                  <c:v>40</c:v>
                 </c:pt>
                 <c:pt idx="9">
-                  <c:v>45.0</c:v>
+                  <c:v>45</c:v>
                 </c:pt>
                 <c:pt idx="10">
-                  <c:v>50.0</c:v>
+                  <c:v>50</c:v>
                 </c:pt>
                 <c:pt idx="11">
-                  <c:v>55.0</c:v>
+                  <c:v>55</c:v>
                 </c:pt>
                 <c:pt idx="12">
-                  <c:v>60.0</c:v>
+                  <c:v>60</c:v>
                 </c:pt>
                 <c:pt idx="13">
-                  <c:v>65.0</c:v>
+                  <c:v>65</c:v>
                 </c:pt>
                 <c:pt idx="14">
-                  <c:v>70.0</c:v>
+                  <c:v>70</c:v>
                 </c:pt>
                 <c:pt idx="15">
-                  <c:v>75.0</c:v>
+                  <c:v>75</c:v>
                 </c:pt>
                 <c:pt idx="16">
-                  <c:v>80.0</c:v>
+                  <c:v>80</c:v>
                 </c:pt>
                 <c:pt idx="17">
-                  <c:v>85.0</c:v>
+                  <c:v>85</c:v>
                 </c:pt>
                 <c:pt idx="18">
-                  <c:v>90.0</c:v>
+                  <c:v>90</c:v>
                 </c:pt>
                 <c:pt idx="19">
-                  <c:v>95.0</c:v>
+                  <c:v>95</c:v>
                 </c:pt>
                 <c:pt idx="20">
-                  <c:v>100.0</c:v>
+                  <c:v>100</c:v>
                 </c:pt>
               </c:numCache>
             </c:numRef>
@@ -246,72 +234,71 @@
                 <c:formatCode>General</c:formatCode>
                 <c:ptCount val="21"/>
                 <c:pt idx="0">
-                  <c:v>80.19210002563975</c:v>
+                  <c:v>80.192100025639746</c:v>
                 </c:pt>
                 <c:pt idx="1">
-                  <c:v>85.11285232942964</c:v>
+                  <c:v>85.112852329429614</c:v>
                 </c:pt>
                 <c:pt idx="2">
-                  <c:v>84.91545814691288</c:v>
+                  <c:v>84.915458146912883</c:v>
                 </c:pt>
                 <c:pt idx="3">
-                  <c:v>88.54140493220702</c:v>
+                  <c:v>88.54140493220703</c:v>
                 </c:pt>
                 <c:pt idx="4">
-                  <c:v>89.27475590272564</c:v>
+                  <c:v>89.27475590272563</c:v>
                 </c:pt>
                 <c:pt idx="5">
-                  <c:v>89.81423933100563</c:v>
+                  <c:v>89.814239331005638</c:v>
                 </c:pt>
                 <c:pt idx="6">
-                  <c:v>92.13702556556577</c:v>
+                  <c:v>92.137025565565779</c:v>
                 </c:pt>
                 <c:pt idx="7">
-                  <c:v>92.92244994103246</c:v>
+                  <c:v>92.922449941032468</c:v>
                 </c:pt>
                 <c:pt idx="8">
-                  <c:v>94.18008929555457</c:v>
+                  <c:v>94.180089295554552</c:v>
                 </c:pt>
                 <c:pt idx="9">
-                  <c:v>95.457617229929</c:v>
+                  <c:v>95.457617229929014</c:v>
                 </c:pt>
                 <c:pt idx="10">
-                  <c:v>95.51548354894366</c:v>
+                  <c:v>95.515483548943664</c:v>
                 </c:pt>
                 <c:pt idx="11">
-                  <c:v>97.22333007274106</c:v>
+                  <c:v>97.223330072741035</c:v>
                 </c:pt>
                 <c:pt idx="12">
-                  <c:v>97.6346790433192</c:v>
+                  <c:v>97.63467904331921</c:v>
                 </c:pt>
                 <c:pt idx="13">
-                  <c:v>98.20510272849836</c:v>
+                  <c:v>98.205102728498346</c:v>
                 </c:pt>
                 <c:pt idx="14">
-                  <c:v>98.93786531251371</c:v>
+                  <c:v>98.937865312513708</c:v>
                 </c:pt>
                 <c:pt idx="15">
-                  <c:v>99.31417556488821</c:v>
+                  <c:v>99.314175564888217</c:v>
                 </c:pt>
                 <c:pt idx="16">
-                  <c:v>99.65650090984233</c:v>
+                  <c:v>99.656500909842336</c:v>
                 </c:pt>
                 <c:pt idx="17">
-                  <c:v>91.01109929063072</c:v>
+                  <c:v>91.011099290630725</c:v>
                 </c:pt>
                 <c:pt idx="18">
                   <c:v>71.3424935476028</c:v>
                 </c:pt>
                 <c:pt idx="19">
-                  <c:v>71.19979473850643</c:v>
+                  <c:v>71.199794738506412</c:v>
                 </c:pt>
                 <c:pt idx="20">
-                  <c:v>70.64574966767663</c:v>
+                  <c:v>70.645749667676625</c:v>
                 </c:pt>
               </c:numCache>
             </c:numRef>
           </c:val>
-          <c:smooth val="0"/>
         </c:ser>
         <c:ser>
           <c:idx val="0"/>
@@ -329,67 +316,67 @@
                 <c:formatCode>General</c:formatCode>
                 <c:ptCount val="21"/>
                 <c:pt idx="0">
-                  <c:v>0.0</c:v>
+                  <c:v>0</c:v>
                 </c:pt>
                 <c:pt idx="1">
-                  <c:v>5.0</c:v>
+                  <c:v>5</c:v>
                 </c:pt>
                 <c:pt idx="2">
-                  <c:v>10.0</c:v>
+                  <c:v>10</c:v>
                 </c:pt>
                 <c:pt idx="3">
-                  <c:v>15.0</c:v>
+                  <c:v>15</c:v>
                 </c:pt>
                 <c:pt idx="4">
-                  <c:v>20.0</c:v>
+                  <c:v>20</c:v>
                 </c:pt>
                 <c:pt idx="5">
-                  <c:v>25.0</c:v>
+                  <c:v>25</c:v>
                 </c:pt>
                 <c:pt idx="6">
-                  <c:v>30.0</c:v>
+                  <c:v>30</c:v>
                 </c:pt>
                 <c:pt idx="7">
-                  <c:v>35.0</c:v>
+                  <c:v>35</c:v>
                 </c:pt>
                 <c:pt idx="8">
-                  <c:v>40.0</c:v>
+                  <c:v>40</c:v>
                 </c:pt>
                 <c:pt idx="9">
-                  <c:v>45.0</c:v>
+                  <c:v>45</c:v>
                 </c:pt>
                 <c:pt idx="10">
-                  <c:v>50.0</c:v>
+                  <c:v>50</c:v>
                 </c:pt>
                 <c:pt idx="11">
-                  <c:v>55.0</c:v>
+                  <c:v>55</c:v>
                 </c:pt>
                 <c:pt idx="12">
-                  <c:v>60.0</c:v>
+                  <c:v>60</c:v>
                 </c:pt>
                 <c:pt idx="13">
-                  <c:v>65.0</c:v>
+                  <c:v>65</c:v>
                 </c:pt>
                 <c:pt idx="14">
-                  <c:v>70.0</c:v>
+                  <c:v>70</c:v>
                 </c:pt>
                 <c:pt idx="15">
-                  <c:v>75.0</c:v>
+                  <c:v>75</c:v>
                 </c:pt>
                 <c:pt idx="16">
-                  <c:v>80.0</c:v>
+                  <c:v>80</c:v>
                 </c:pt>
                 <c:pt idx="17">
-                  <c:v>85.0</c:v>
+                  <c:v>85</c:v>
                 </c:pt>
                 <c:pt idx="18">
-                  <c:v>90.0</c:v>
+                  <c:v>90</c:v>
                 </c:pt>
                 <c:pt idx="19">
-                  <c:v>95.0</c:v>
+                  <c:v>95</c:v>
                 </c:pt>
                 <c:pt idx="20">
-                  <c:v>100.0</c:v>
+                  <c:v>100</c:v>
                 </c:pt>
               </c:numCache>
             </c:numRef>
@@ -401,92 +388,82 @@
                 <c:formatCode>General</c:formatCode>
                 <c:ptCount val="21"/>
                 <c:pt idx="0">
-                  <c:v>0.23550724637681</c:v>
+                  <c:v>0.23550724637681003</c:v>
                 </c:pt>
                 <c:pt idx="1">
-                  <c:v>0.0</c:v>
+                  <c:v>0</c:v>
                 </c:pt>
                 <c:pt idx="2">
-                  <c:v>0.0</c:v>
+                  <c:v>0</c:v>
                 </c:pt>
                 <c:pt idx="3">
-                  <c:v>0.0</c:v>
+                  <c:v>0</c:v>
                 </c:pt>
                 <c:pt idx="4">
-                  <c:v>0.0</c:v>
+                  <c:v>0</c:v>
                 </c:pt>
                 <c:pt idx="5">
-                  <c:v>0.0</c:v>
+                  <c:v>0</c:v>
                 </c:pt>
                 <c:pt idx="6">
-                  <c:v>0.0</c:v>
+                  <c:v>0</c:v>
                 </c:pt>
                 <c:pt idx="7">
-                  <c:v>0.0</c:v>
+                  <c:v>0</c:v>
                 </c:pt>
                 <c:pt idx="8">
-                  <c:v>0.0</c:v>
+                  <c:v>0</c:v>
                 </c:pt>
                 <c:pt idx="9">
-                  <c:v>0.0</c:v>
+                  <c:v>0</c:v>
                 </c:pt>
                 <c:pt idx="10">
-                  <c:v>0.0</c:v>
+                  <c:v>0</c:v>
                 </c:pt>
                 <c:pt idx="11">
-                  <c:v>0.0</c:v>
+                  <c:v>0</c:v>
                 </c:pt>
                 <c:pt idx="12">
-                  <c:v>0.0</c:v>
+                  <c:v>0</c:v>
                 </c:pt>
                 <c:pt idx="13">
-                  <c:v>0.0</c:v>
+                  <c:v>0</c:v>
                 </c:pt>
                 <c:pt idx="14">
-                  <c:v>0.0</c:v>
+                  <c:v>0</c:v>
                 </c:pt>
                 <c:pt idx="15">
-                  <c:v>0.0</c:v>
+                  <c:v>0</c:v>
                 </c:pt>
                 <c:pt idx="16">
-                  <c:v>0.0</c:v>
+                  <c:v>0</c:v>
                 </c:pt>
                 <c:pt idx="17">
-                  <c:v>19.76545714880294</c:v>
+                  <c:v>19.765457148802938</c:v>
                 </c:pt>
                 <c:pt idx="18">
-                  <c:v>52.8636614250255</c:v>
+                  <c:v>52.863661425025491</c:v>
                 </c:pt>
                 <c:pt idx="19">
                   <c:v>52.75382843542117</c:v>
                 </c:pt>
                 <c:pt idx="20">
-                  <c:v>53.7688644734769</c:v>
+                  <c:v>53.768864473476896</c:v>
                 </c:pt>
               </c:numCache>
             </c:numRef>
           </c:val>
-          <c:smooth val="0"/>
         </c:ser>
-        <c:dLbls>
-          <c:showLegendKey val="0"/>
-          <c:showVal val="0"/>
-          <c:showCatName val="0"/>
-          <c:showSerName val="0"/>
-          <c:showPercent val="0"/>
-          <c:showBubbleSize val="0"/>
-        </c:dLbls>
+        <c:dLbls/>
         <c:marker val="1"/>
-        <c:smooth val="0"/>
-        <c:axId val="2112966664"/>
-        <c:axId val="2110288520"/>
+        <c:axId val="105504128"/>
+        <c:axId val="105678336"/>
       </c:lineChart>
       <c:catAx>
-        <c:axId val="2112966664"/>
+        <c:axId val="105504128"/>
         <c:scaling>
           <c:orientation val="minMax"/>
         </c:scaling>
-        <c:delete val="0"/>
         <c:axPos val="b"/>
         <c:title>
           <c:tx>
@@ -509,26 +486,21 @@
             </c:rich>
           </c:tx>
           <c:layout/>
-          <c:overlay val="0"/>
         </c:title>
         <c:numFmt formatCode="General" sourceLinked="1"/>
-        <c:majorTickMark val="out"/>
-        <c:minorTickMark val="none"/>
         <c:tickLblPos val="nextTo"/>
-        <c:crossAx val="2110288520"/>
+        <c:crossAx val="105678336"/>
         <c:crosses val="autoZero"/>
         <c:auto val="1"/>
         <c:lblAlgn val="ctr"/>
         <c:lblOffset val="100"/>
-        <c:noMultiLvlLbl val="0"/>
       </c:catAx>
       <c:valAx>
-        <c:axId val="2110288520"/>
+        <c:axId val="105678336"/>
         <c:scaling>
           <c:orientation val="minMax"/>
-          <c:max val="100.0"/>
+          <c:max val="100"/>
         </c:scaling>
-        <c:delete val="0"/>
         <c:axPos val="l"/>
         <c:majorGridlines/>
         <c:title>
@@ -548,13 +520,10 @@
             </c:rich>
           </c:tx>
           <c:layout/>
-          <c:overlay val="0"/>
         </c:title>
         <c:numFmt formatCode="General" sourceLinked="1"/>
-        <c:majorTickMark val="out"/>
-        <c:minorTickMark val="none"/>
         <c:tickLblPos val="nextTo"/>
-        <c:crossAx val="2112966664"/>
+        <c:crossAx val="105504128"/>
         <c:crosses val="autoZero"/>
         <c:crossBetween val="between"/>
       </c:valAx>
@@ -562,42 +531,26 @@
     <c:legend>
       <c:legendPos val="r"/>
       <c:layout/>
-      <c:overlay val="0"/>
     </c:legend>
     <c:plotVisOnly val="1"/>
     <c:dispBlanksAs val="gap"/>
-    <c:showDLblsOverMax val="0"/>
   </c:chart>
-  <c:externalData r:id="rId1">
-    <c:autoUpdate val="0"/>
-  </c:externalData>
+  <c:externalData r:id="rId1"/>
 </c:chartSpace>
 </file>
 
 <file path=ppt/charts/chart2.xml><?xml version="1.0" encoding="utf-8"?>
 <c:chartSpace xmlns:c="http://schemas.openxmlformats.org/drawingml/2006/chart" xmlns:a="http://schemas.openxmlformats.org/drawingml/2006/main" xmlns:r="http://schemas.openxmlformats.org/officeDocument/2006/relationships">
-  <c:date1904 val="0"/>
   <c:lang val="en-US"/>
-  <c:roundedCorners val="0"/>
-  <mc:AlternateContent xmlns:mc="http://schemas.openxmlformats.org/markup-compatibility/2006">
-    <mc:Choice xmlns:c14="http://schemas.microsoft.com/office/drawing/2007/8/2/chart" Requires="c14">
-      <c14:style val="118"/>
-    </mc:Choice>
-    <mc:Fallback>
-      <c:style val="18"/>
-    </mc:Fallback>
-  </mc:AlternateContent>
+  <c:style val="18"/>
   <c:chart>
     <c:title>
       <c:layout/>
-      <c:overlay val="0"/>
     </c:title>
-    <c:autoTitleDeleted val="0"/>
     <c:plotArea>
       <c:layout/>
       <c:lineChart>
         <c:grouping val="standard"/>
-        <c:varyColors val="0"/>
         <c:ser>
           <c:idx val="0"/>
           <c:order val="0"/>
@@ -614,67 +567,67 @@
                 <c:formatCode>General</c:formatCode>
                 <c:ptCount val="21"/>
                 <c:pt idx="0">
-                  <c:v>0.0</c:v>
+                  <c:v>0</c:v>
                 </c:pt>
                 <c:pt idx="1">
-                  <c:v>5.0</c:v>
+                  <c:v>5</c:v>
                 </c:pt>
                 <c:pt idx="2">
-                  <c:v>10.0</c:v>
+                  <c:v>10</c:v>
                 </c:pt>
                 <c:pt idx="3">
-                  <c:v>15.0</c:v>
+                  <c:v>15</c:v>
                 </c:pt>
                 <c:pt idx="4">
-                  <c:v>20.0</c:v>
+                  <c:v>20</c:v>
                 </c:pt>
                 <c:pt idx="5">
-                  <c:v>25.0</c:v>
+                  <c:v>25</c:v>
                 </c:pt>
                 <c:pt idx="6">
-                  <c:v>30.0</c:v>
+                  <c:v>30</c:v>
                 </c:pt>
                 <c:pt idx="7">
-                  <c:v>35.0</c:v>
+                  <c:v>35</c:v>
                 </c:pt>
                 <c:pt idx="8">
-                  <c:v>40.0</c:v>
+                  <c:v>40</c:v>
                 </c:pt>
                 <c:pt idx="9">
-                  <c:v>45.0</c:v>
+                  <c:v>45</c:v>
                 </c:pt>
                 <c:pt idx="10">
-                  <c:v>50.0</c:v>
+                  <c:v>50</c:v>
                 </c:pt>
                 <c:pt idx="11">
-                  <c:v>55.0</c:v>
+                  <c:v>55</c:v>
                 </c:pt>
                 <c:pt idx="12">
-                  <c:v>60.0</c:v>
+                  <c:v>60</c:v>
                 </c:pt>
                 <c:pt idx="13">
-                  <c:v>65.0</c:v>
+                  <c:v>65</c:v>
                 </c:pt>
                 <c:pt idx="14">
-                  <c:v>70.0</c:v>
+                  <c:v>70</c:v>
                 </c:pt>
                 <c:pt idx="15">
-                  <c:v>75.0</c:v>
+                  <c:v>75</c:v>
                 </c:pt>
                 <c:pt idx="16">
-                  <c:v>80.0</c:v>
+                  <c:v>80</c:v>
                 </c:pt>
                 <c:pt idx="17">
-                  <c:v>85.0</c:v>
+                  <c:v>85</c:v>
                 </c:pt>
                 <c:pt idx="18">
-                  <c:v>90.0</c:v>
+                  <c:v>90</c:v>
                 </c:pt>
                 <c:pt idx="19">
-                  <c:v>95.0</c:v>
+                  <c:v>95</c:v>
                 </c:pt>
                 <c:pt idx="20">
-                  <c:v>100.0</c:v>
+                  <c:v>100</c:v>
                 </c:pt>
               </c:numCache>
             </c:numRef>
@@ -698,7 +651,7 @@
                   <c:v>68.8</c:v>
                 </c:pt>
                 <c:pt idx="4">
-                  <c:v>80.4</c:v>
+                  <c:v>80.400000000000006</c:v>
                 </c:pt>
                 <c:pt idx="5">
                   <c:v>59.4</c:v>
@@ -710,10 +663,10 @@
                   <c:v>66.2</c:v>
                 </c:pt>
                 <c:pt idx="8">
-                  <c:v>63.0</c:v>
+                  <c:v>63</c:v>
                 </c:pt>
                 <c:pt idx="9">
-                  <c:v>73.0</c:v>
+                  <c:v>73</c:v>
                 </c:pt>
                 <c:pt idx="10">
                   <c:v>68.2</c:v>
@@ -722,10 +675,10 @@
                   <c:v>85.4</c:v>
                 </c:pt>
                 <c:pt idx="12">
-                  <c:v>65.0</c:v>
+                  <c:v>65</c:v>
                 </c:pt>
                 <c:pt idx="13">
-                  <c:v>72.6</c:v>
+                  <c:v>72.599999999999994</c:v>
                 </c:pt>
                 <c:pt idx="14">
                   <c:v>105.6</c:v>
@@ -734,44 +687,34 @@
                   <c:v>105.2</c:v>
                 </c:pt>
                 <c:pt idx="16">
-                  <c:v>134.8</c:v>
+                  <c:v>134.80000000000001</c:v>
                 </c:pt>
                 <c:pt idx="17">
-                  <c:v>1000.0</c:v>
+                  <c:v>1000</c:v>
                 </c:pt>
                 <c:pt idx="18">
-                  <c:v>1000.0</c:v>
+                  <c:v>1000</c:v>
                 </c:pt>
                 <c:pt idx="19">
-                  <c:v>1000.0</c:v>
+                  <c:v>1000</c:v>
                 </c:pt>
                 <c:pt idx="20">
-                  <c:v>1000.0</c:v>
+                  <c:v>1000</c:v>
                 </c:pt>
               </c:numCache>
             </c:numRef>
           </c:val>
-          <c:smooth val="0"/>
         </c:ser>
-        <c:dLbls>
-          <c:showLegendKey val="0"/>
-          <c:showVal val="0"/>
-          <c:showCatName val="0"/>
-          <c:showSerName val="0"/>
-          <c:showPercent val="0"/>
-          <c:showBubbleSize val="0"/>
-        </c:dLbls>
+        <c:dLbls/>
         <c:marker val="1"/>
-        <c:smooth val="0"/>
-        <c:axId val="2066672088"/>
-        <c:axId val="2066654872"/>
+        <c:axId val="105698816"/>
+        <c:axId val="105700736"/>
       </c:lineChart>
       <c:catAx>
-        <c:axId val="2066672088"/>
+        <c:axId val="105698816"/>
         <c:scaling>
           <c:orientation val="minMax"/>
         </c:scaling>
-        <c:delete val="0"/>
         <c:axPos val="b"/>
         <c:title>
           <c:tx>
@@ -795,25 +738,20 @@
             </c:rich>
           </c:tx>
           <c:layout/>
-          <c:overlay val="0"/>
         </c:title>
         <c:numFmt formatCode="General" sourceLinked="1"/>
-        <c:majorTickMark val="out"/>
-        <c:minorTickMark val="none"/>
         <c:tickLblPos val="nextTo"/>
-        <c:crossAx val="2066654872"/>
+        <c:crossAx val="105700736"/>
         <c:crosses val="autoZero"/>
         <c:auto val="1"/>
         <c:lblAlgn val="ctr"/>
         <c:lblOffset val="100"/>
-        <c:noMultiLvlLbl val="0"/>
       </c:catAx>
       <c:valAx>
-        <c:axId val="2066654872"/>
+        <c:axId val="105700736"/>
         <c:scaling>
           <c:orientation val="minMax"/>
         </c:scaling>
-        <c:delete val="0"/>
         <c:axPos val="l"/>
         <c:majorGridlines/>
         <c:title>
@@ -833,13 +771,10 @@
             </c:rich>
           </c:tx>
           <c:layout/>
-          <c:overlay val="0"/>
         </c:title>
         <c:numFmt formatCode="General" sourceLinked="1"/>
-        <c:majorTickMark val="out"/>
-        <c:minorTickMark val="none"/>
         <c:tickLblPos val="nextTo"/>
-        <c:crossAx val="2066672088"/>
+        <c:crossAx val="105698816"/>
         <c:crosses val="autoZero"/>
         <c:crossBetween val="between"/>
       </c:valAx>
@@ -847,15 +782,11 @@
     <c:legend>
       <c:legendPos val="r"/>
       <c:layout/>
-      <c:overlay val="0"/>
     </c:legend>
     <c:plotVisOnly val="1"/>
     <c:dispBlanksAs val="gap"/>
-    <c:showDLblsOverMax val="0"/>
   </c:chart>
-  <c:externalData r:id="rId1">
-    <c:autoUpdate val="0"/>
-  </c:externalData>
+  <c:externalData r:id="rId1"/>
 </c:chartSpace>
 </file>
 
@@ -1295,7 +1226,8 @@
           <a:p>
             <a:fld id="{7D290233-0DD1-4A80-BB1E-9ADC3556DBB6}" type="datetimeFigureOut">
               <a:rPr lang="en-US" smtClean="0"/>
-              <a:t>9/27/15</a:t>
+              <a:pPr/>
+              <a:t>9/27/2015</a:t>
             </a:fld>
             <a:endParaRPr lang="en-US"/>
           </a:p>
@@ -1347,6 +1279,7 @@
           <a:p>
             <a:fld id="{CFE4BAC9-6D41-4691-9299-18EF07EF0177}" type="slidenum">
               <a:rPr lang="en-US" smtClean="0"/>
+              <a:pPr/>
               <a:t>‹#›</a:t>
             </a:fld>
             <a:endParaRPr lang="en-US"/>
@@ -1906,7 +1839,8 @@
           <a:p>
             <a:fld id="{7D290233-0DD1-4A80-BB1E-9ADC3556DBB6}" type="datetimeFigureOut">
               <a:rPr lang="en-US" smtClean="0"/>
-              <a:t>9/27/15</a:t>
+              <a:pPr/>
+              <a:t>9/27/2015</a:t>
             </a:fld>
             <a:endParaRPr lang="en-US"/>
           </a:p>
@@ -1948,6 +1882,7 @@
           <a:p>
             <a:fld id="{CFE4BAC9-6D41-4691-9299-18EF07EF0177}" type="slidenum">
               <a:rPr lang="en-US" smtClean="0"/>
+              <a:pPr/>
               <a:t>‹#›</a:t>
             </a:fld>
             <a:endParaRPr lang="en-US"/>
@@ -2478,7 +2413,8 @@
           <a:p>
             <a:fld id="{7D290233-0DD1-4A80-BB1E-9ADC3556DBB6}" type="datetimeFigureOut">
               <a:rPr lang="en-US" smtClean="0"/>
-              <a:t>9/27/15</a:t>
+              <a:pPr/>
+              <a:t>9/27/2015</a:t>
             </a:fld>
             <a:endParaRPr lang="en-US"/>
           </a:p>
@@ -2520,6 +2456,7 @@
           <a:p>
             <a:fld id="{CFE4BAC9-6D41-4691-9299-18EF07EF0177}" type="slidenum">
               <a:rPr lang="en-US" smtClean="0"/>
+              <a:pPr/>
               <a:t>‹#›</a:t>
             </a:fld>
             <a:endParaRPr lang="en-US"/>
@@ -3012,7 +2949,8 @@
           <a:p>
             <a:fld id="{7D290233-0DD1-4A80-BB1E-9ADC3556DBB6}" type="datetimeFigureOut">
               <a:rPr lang="en-US" smtClean="0"/>
-              <a:t>9/27/15</a:t>
+              <a:pPr/>
+              <a:t>9/27/2015</a:t>
             </a:fld>
             <a:endParaRPr lang="en-US"/>
           </a:p>
@@ -3054,6 +2992,7 @@
           <a:p>
             <a:fld id="{CFE4BAC9-6D41-4691-9299-18EF07EF0177}" type="slidenum">
               <a:rPr lang="en-US" smtClean="0"/>
+              <a:pPr/>
               <a:t>‹#›</a:t>
             </a:fld>
             <a:endParaRPr lang="en-US"/>
@@ -3414,7 +3353,8 @@
           <a:p>
             <a:fld id="{7D290233-0DD1-4A80-BB1E-9ADC3556DBB6}" type="datetimeFigureOut">
               <a:rPr lang="en-US" smtClean="0"/>
-              <a:t>9/27/15</a:t>
+              <a:pPr/>
+              <a:t>9/27/2015</a:t>
             </a:fld>
             <a:endParaRPr lang="en-US"/>
           </a:p>
@@ -3456,6 +3396,7 @@
           <a:p>
             <a:fld id="{CFE4BAC9-6D41-4691-9299-18EF07EF0177}" type="slidenum">
               <a:rPr lang="en-US" smtClean="0"/>
+              <a:pPr/>
               <a:t>‹#›</a:t>
             </a:fld>
             <a:endParaRPr lang="en-US"/>
@@ -3847,7 +3788,8 @@
           <a:p>
             <a:fld id="{7D290233-0DD1-4A80-BB1E-9ADC3556DBB6}" type="datetimeFigureOut">
               <a:rPr lang="en-US" smtClean="0"/>
-              <a:t>9/27/15</a:t>
+              <a:pPr/>
+              <a:t>9/27/2015</a:t>
             </a:fld>
             <a:endParaRPr lang="en-US"/>
           </a:p>
@@ -3889,6 +3831,7 @@
           <a:p>
             <a:fld id="{CFE4BAC9-6D41-4691-9299-18EF07EF0177}" type="slidenum">
               <a:rPr lang="en-US" smtClean="0"/>
+              <a:pPr/>
               <a:t>‹#›</a:t>
             </a:fld>
             <a:endParaRPr lang="en-US"/>
@@ -4249,7 +4192,8 @@
           <a:p>
             <a:fld id="{7D290233-0DD1-4A80-BB1E-9ADC3556DBB6}" type="datetimeFigureOut">
               <a:rPr lang="en-US" smtClean="0"/>
-              <a:t>9/27/15</a:t>
+              <a:pPr/>
+              <a:t>9/27/2015</a:t>
             </a:fld>
             <a:endParaRPr lang="en-US"/>
           </a:p>
@@ -4291,6 +4235,7 @@
           <a:p>
             <a:fld id="{CFE4BAC9-6D41-4691-9299-18EF07EF0177}" type="slidenum">
               <a:rPr lang="en-US" smtClean="0"/>
+              <a:pPr/>
               <a:t>‹#›</a:t>
             </a:fld>
             <a:endParaRPr lang="en-US"/>
@@ -4723,7 +4668,8 @@
           <a:p>
             <a:fld id="{7D290233-0DD1-4A80-BB1E-9ADC3556DBB6}" type="datetimeFigureOut">
               <a:rPr lang="en-US" smtClean="0"/>
-              <a:t>9/27/15</a:t>
+              <a:pPr/>
+              <a:t>9/27/2015</a:t>
             </a:fld>
             <a:endParaRPr lang="en-US"/>
           </a:p>
@@ -5173,7 +5119,8 @@
           <a:p>
             <a:fld id="{7D290233-0DD1-4A80-BB1E-9ADC3556DBB6}" type="datetimeFigureOut">
               <a:rPr lang="en-US" smtClean="0"/>
-              <a:t>9/27/15</a:t>
+              <a:pPr/>
+              <a:t>9/27/2015</a:t>
             </a:fld>
             <a:endParaRPr lang="en-US"/>
           </a:p>
@@ -5215,6 +5162,7 @@
           <a:p>
             <a:fld id="{CFE4BAC9-6D41-4691-9299-18EF07EF0177}" type="slidenum">
               <a:rPr lang="en-US" smtClean="0"/>
+              <a:pPr/>
               <a:t>‹#›</a:t>
             </a:fld>
             <a:endParaRPr lang="en-US"/>
@@ -5693,7 +5641,8 @@
           <a:p>
             <a:fld id="{7D290233-0DD1-4A80-BB1E-9ADC3556DBB6}" type="datetimeFigureOut">
               <a:rPr lang="en-US" smtClean="0"/>
-              <a:t>9/27/15</a:t>
+              <a:pPr/>
+              <a:t>9/27/2015</a:t>
             </a:fld>
             <a:endParaRPr lang="en-US"/>
           </a:p>
@@ -5735,6 +5684,7 @@
           <a:p>
             <a:fld id="{CFE4BAC9-6D41-4691-9299-18EF07EF0177}" type="slidenum">
               <a:rPr lang="en-US" smtClean="0"/>
+              <a:pPr/>
               <a:t>‹#›</a:t>
             </a:fld>
             <a:endParaRPr lang="en-US"/>
@@ -6413,7 +6363,8 @@
           <a:p>
             <a:fld id="{7D290233-0DD1-4A80-BB1E-9ADC3556DBB6}" type="datetimeFigureOut">
               <a:rPr lang="en-US" smtClean="0"/>
-              <a:t>9/27/15</a:t>
+              <a:pPr/>
+              <a:t>9/27/2015</a:t>
             </a:fld>
             <a:endParaRPr lang="en-US"/>
           </a:p>
@@ -6455,6 +6406,7 @@
           <a:p>
             <a:fld id="{CFE4BAC9-6D41-4691-9299-18EF07EF0177}" type="slidenum">
               <a:rPr lang="en-US" smtClean="0"/>
+              <a:pPr/>
               <a:t>‹#›</a:t>
             </a:fld>
             <a:endParaRPr lang="en-US"/>
@@ -6759,7 +6711,8 @@
           <a:p>
             <a:fld id="{7D290233-0DD1-4A80-BB1E-9ADC3556DBB6}" type="datetimeFigureOut">
               <a:rPr lang="en-US" smtClean="0"/>
-              <a:t>9/27/15</a:t>
+              <a:pPr/>
+              <a:t>9/27/2015</a:t>
             </a:fld>
             <a:endParaRPr lang="en-US"/>
           </a:p>
@@ -6801,6 +6754,7 @@
           <a:p>
             <a:fld id="{CFE4BAC9-6D41-4691-9299-18EF07EF0177}" type="slidenum">
               <a:rPr lang="en-US" smtClean="0"/>
+              <a:pPr/>
               <a:t>‹#›</a:t>
             </a:fld>
             <a:endParaRPr lang="en-US"/>
@@ -7028,7 +6982,8 @@
           <a:p>
             <a:fld id="{7D290233-0DD1-4A80-BB1E-9ADC3556DBB6}" type="datetimeFigureOut">
               <a:rPr lang="en-US" smtClean="0"/>
-              <a:t>9/27/15</a:t>
+              <a:pPr/>
+              <a:t>9/27/2015</a:t>
             </a:fld>
             <a:endParaRPr lang="en-US"/>
           </a:p>
@@ -7070,6 +7025,7 @@
           <a:p>
             <a:fld id="{CFE4BAC9-6D41-4691-9299-18EF07EF0177}" type="slidenum">
               <a:rPr lang="en-US" smtClean="0"/>
+              <a:pPr/>
               <a:t>‹#›</a:t>
             </a:fld>
             <a:endParaRPr lang="en-US"/>
@@ -7585,7 +7541,8 @@
           <a:p>
             <a:fld id="{7D290233-0DD1-4A80-BB1E-9ADC3556DBB6}" type="datetimeFigureOut">
               <a:rPr lang="en-US" smtClean="0"/>
-              <a:t>9/27/15</a:t>
+              <a:pPr/>
+              <a:t>9/27/2015</a:t>
             </a:fld>
             <a:endParaRPr lang="en-US"/>
           </a:p>
@@ -7627,6 +7584,7 @@
           <a:p>
             <a:fld id="{CFE4BAC9-6D41-4691-9299-18EF07EF0177}" type="slidenum">
               <a:rPr lang="en-US" smtClean="0"/>
+              <a:pPr/>
               <a:t>‹#›</a:t>
             </a:fld>
             <a:endParaRPr lang="en-US"/>
@@ -7795,7 +7753,8 @@
           <a:p>
             <a:fld id="{7D290233-0DD1-4A80-BB1E-9ADC3556DBB6}" type="datetimeFigureOut">
               <a:rPr lang="en-US" smtClean="0"/>
-              <a:t>9/27/15</a:t>
+              <a:pPr/>
+              <a:t>9/27/2015</a:t>
             </a:fld>
             <a:endParaRPr lang="en-US"/>
           </a:p>
@@ -7881,6 +7840,7 @@
           <a:p>
             <a:fld id="{CFE4BAC9-6D41-4691-9299-18EF07EF0177}" type="slidenum">
               <a:rPr lang="en-US" smtClean="0"/>
+              <a:pPr/>
               <a:t>‹#›</a:t>
             </a:fld>
             <a:endParaRPr lang="en-US"/>
@@ -8346,7 +8306,7 @@
     </p:spTree>
     <p:extLst>
       <p:ext uri="{BB962C8B-B14F-4D97-AF65-F5344CB8AC3E}">
-        <p14:creationId xmlns:p14="http://schemas.microsoft.com/office/powerpoint/2010/main" val="1880065562"/>
+        <p14:creationId xmlns:p14="http://schemas.microsoft.com/office/powerpoint/2010/main" xmlns="" val="1880065562"/>
       </p:ext>
     </p:extLst>
   </p:cSld>
@@ -8416,7 +8376,7 @@
         </p:spPr>
         <p:txBody>
           <a:bodyPr>
-            <a:normAutofit fontScale="92500" lnSpcReduction="10000"/>
+            <a:normAutofit fontScale="77500" lnSpcReduction="20000"/>
           </a:bodyPr>
           <a:lstStyle/>
           <a:p>
@@ -8438,7 +8398,23 @@
             </a:pPr>
             <a:r>
               <a:rPr lang="en-US" dirty="0" smtClean="0"/>
-              <a:t>How do different age groups with different tolerances affect the level of segregation within a community.</a:t>
+              <a:t>How do </a:t>
+            </a:r>
+            <a:r>
+              <a:rPr lang="en-US" dirty="0" smtClean="0"/>
+              <a:t>different </a:t>
+            </a:r>
+            <a:r>
+              <a:rPr lang="en-US" dirty="0" smtClean="0"/>
+              <a:t>age groups </a:t>
+            </a:r>
+            <a:r>
+              <a:rPr lang="en-US" dirty="0" smtClean="0"/>
+              <a:t>(young and old) with </a:t>
+            </a:r>
+            <a:r>
+              <a:rPr lang="en-US" dirty="0" smtClean="0"/>
+              <a:t>different tolerances affect the level of segregation within a community.</a:t>
             </a:r>
             <a:endParaRPr lang="en-US" dirty="0"/>
           </a:p>
@@ -8456,26 +8432,30 @@
             </a:r>
           </a:p>
           <a:p>
-            <a:pPr marL="0" indent="0">
-              <a:buNone/>
-            </a:pPr>
-            <a:r>
-              <a:rPr lang="en-US" dirty="0"/>
-              <a:t>Having a subset of each type of agent with lower tolerances will assist higher tolerance agents to be </a:t>
-            </a:r>
+            <a:pPr marL="0" indent="0"/>
             <a:r>
               <a:rPr lang="en-US" dirty="0" smtClean="0"/>
-              <a:t>happier</a:t>
-            </a:r>
-            <a:r>
-              <a:rPr lang="en-US" dirty="0"/>
+              <a:t> More integration </a:t>
+            </a:r>
+          </a:p>
+          <a:p>
+            <a:pPr marL="0" indent="0"/>
+            <a:r>
+              <a:rPr lang="en-US" dirty="0" smtClean="0"/>
+              <a:t> Expect younger more on the edges of clusters</a:t>
+            </a:r>
+          </a:p>
+          <a:p>
+            <a:pPr marL="0" indent="0"/>
+            <a:r>
+              <a:rPr lang="en-US" dirty="0" smtClean="0"/>
               <a:t> </a:t>
             </a:r>
             <a:r>
               <a:rPr lang="en-US" dirty="0" smtClean="0"/>
-              <a:t>and form clusters easier.</a:t>
-            </a:r>
-            <a:endParaRPr lang="en-US" dirty="0"/>
+              <a:t>Less ticks to equilibrium</a:t>
+            </a:r>
+            <a:endParaRPr lang="en-US" dirty="0" smtClean="0"/>
           </a:p>
           <a:p>
             <a:pPr marL="0" indent="0">
@@ -8496,15 +8476,28 @@
             </a:pPr>
             <a:r>
               <a:rPr lang="en-US" dirty="0" smtClean="0"/>
-              <a:t>Because the portion of agents with lower tolerances will be more likely to stay in one location this would lead agents with high tolerances to stay as well and form clusters.</a:t>
-            </a:r>
+              <a:t>Having a subset of each type of agent </a:t>
+            </a:r>
+            <a:r>
+              <a:rPr lang="en-US" dirty="0" smtClean="0"/>
+              <a:t>(red green) with </a:t>
+            </a:r>
+            <a:r>
+              <a:rPr lang="en-US" dirty="0" smtClean="0"/>
+              <a:t>lower similarity requirements </a:t>
+            </a:r>
+            <a:r>
+              <a:rPr lang="en-US" dirty="0" smtClean="0"/>
+              <a:t>will allow them to be happy in more integrated neighborhood. </a:t>
+            </a:r>
+            <a:endParaRPr lang="en-US" dirty="0" smtClean="0"/>
           </a:p>
         </p:txBody>
       </p:sp>
     </p:spTree>
     <p:extLst>
       <p:ext uri="{BB962C8B-B14F-4D97-AF65-F5344CB8AC3E}">
-        <p14:creationId xmlns:p14="http://schemas.microsoft.com/office/powerpoint/2010/main" val="4047314403"/>
+        <p14:creationId xmlns:p14="http://schemas.microsoft.com/office/powerpoint/2010/main" xmlns="" val="4047314403"/>
       </p:ext>
     </p:extLst>
   </p:cSld>
@@ -8574,7 +8567,7 @@
         </p:spPr>
         <p:txBody>
           <a:bodyPr>
-            <a:normAutofit lnSpcReduction="10000"/>
+            <a:normAutofit fontScale="55000" lnSpcReduction="20000"/>
           </a:bodyPr>
           <a:lstStyle/>
           <a:p>
@@ -8591,44 +8584,109 @@
             </a:r>
           </a:p>
           <a:p>
-            <a:pPr>
-              <a:buFontTx/>
-              <a:buChar char="-"/>
+            <a:r>
+              <a:rPr lang="en-US" dirty="0" smtClean="0"/>
+              <a:t>Two types of agents:</a:t>
+            </a:r>
+          </a:p>
+          <a:p>
+            <a:pPr lvl="1">
+              <a:buClrTx/>
+              <a:buFont typeface="Wingdings" pitchFamily="2" charset="2"/>
+              <a:buChar char="Ø"/>
             </a:pPr>
             <a:r>
               <a:rPr lang="en-US" dirty="0" smtClean="0"/>
-              <a:t>Each type of agent is divided into two groups:</a:t>
+              <a:t>Red </a:t>
             </a:r>
           </a:p>
           <a:p>
             <a:pPr lvl="1">
-              <a:buFontTx/>
-              <a:buChar char="-"/>
+              <a:buClrTx/>
+              <a:buFont typeface="Wingdings" pitchFamily="2" charset="2"/>
+              <a:buChar char="Ø"/>
             </a:pPr>
             <a:r>
               <a:rPr lang="en-US" dirty="0" smtClean="0"/>
-              <a:t>Old agents – With a higher tolerance for similar neighbors</a:t>
+              <a:t>Green</a:t>
+            </a:r>
+          </a:p>
+          <a:p>
+            <a:r>
+              <a:rPr lang="en-US" dirty="0" smtClean="0"/>
+              <a:t>Each </a:t>
+            </a:r>
+            <a:r>
+              <a:rPr lang="en-US" dirty="0" smtClean="0"/>
+              <a:t>type of agent is divided into two groups:</a:t>
             </a:r>
           </a:p>
           <a:p>
             <a:pPr lvl="1">
-              <a:buFontTx/>
-              <a:buChar char="-"/>
+              <a:buClr>
+                <a:schemeClr val="tx1"/>
+              </a:buClr>
+              <a:buFont typeface="Wingdings" pitchFamily="2" charset="2"/>
+              <a:buChar char="Ø"/>
             </a:pPr>
             <a:r>
               <a:rPr lang="en-US" dirty="0" smtClean="0"/>
-              <a:t>Young agents – With a lower tolerance for similar neighbors</a:t>
-            </a:r>
-          </a:p>
-          <a:p>
-            <a:pPr>
-              <a:buFontTx/>
-              <a:buChar char="-"/>
+              <a:t>Old agents – With a higher </a:t>
+            </a:r>
+            <a:r>
+              <a:rPr lang="en-US" dirty="0" smtClean="0"/>
+              <a:t>requirement </a:t>
+            </a:r>
+            <a:r>
+              <a:rPr lang="en-US" dirty="0" smtClean="0"/>
+              <a:t>for similar neighbors</a:t>
+            </a:r>
+          </a:p>
+          <a:p>
+            <a:pPr lvl="1">
+              <a:buClr>
+                <a:schemeClr val="tx1"/>
+              </a:buClr>
+              <a:buFont typeface="Wingdings" pitchFamily="2" charset="2"/>
+              <a:buChar char="Ø"/>
             </a:pPr>
             <a:r>
               <a:rPr lang="en-US" dirty="0" smtClean="0"/>
-              <a:t>Each group of the same agent will count as a similar neighbor towards their overall happiness level</a:t>
-            </a:r>
+              <a:t>Young agents – With a lower </a:t>
+            </a:r>
+            <a:r>
+              <a:rPr lang="en-US" dirty="0" smtClean="0"/>
+              <a:t>requirement </a:t>
+            </a:r>
+            <a:r>
+              <a:rPr lang="en-US" dirty="0" smtClean="0"/>
+              <a:t>for similar neighbors</a:t>
+            </a:r>
+          </a:p>
+          <a:p>
+            <a:r>
+              <a:rPr lang="en-US" dirty="0" smtClean="0"/>
+              <a:t>Each group of the same </a:t>
+            </a:r>
+            <a:r>
+              <a:rPr lang="en-US" dirty="0" smtClean="0"/>
+              <a:t>type of agent </a:t>
+            </a:r>
+            <a:r>
+              <a:rPr lang="en-US" dirty="0" smtClean="0"/>
+              <a:t>will count as a similar </a:t>
+            </a:r>
+            <a:r>
+              <a:rPr lang="en-US" dirty="0" smtClean="0"/>
+              <a:t>neighbor</a:t>
+            </a:r>
+          </a:p>
+          <a:p>
+            <a:r>
+              <a:rPr lang="en-US" dirty="0" smtClean="0"/>
+              <a:t>Can adjust density, %young, young % similar, old % similar</a:t>
+            </a:r>
+            <a:endParaRPr lang="en-US" dirty="0" smtClean="0"/>
           </a:p>
           <a:p>
             <a:pPr marL="0" indent="0">
@@ -8644,23 +8702,29 @@
             </a:r>
           </a:p>
           <a:p>
-            <a:pPr>
-              <a:buFontTx/>
-              <a:buChar char="-"/>
-            </a:pPr>
             <a:r>
               <a:rPr lang="en-US" dirty="0" smtClean="0"/>
-              <a:t>Percent of similar neighbors of an agent</a:t>
-            </a:r>
-          </a:p>
-          <a:p>
-            <a:pPr>
-              <a:buFontTx/>
-              <a:buChar char="-"/>
-            </a:pPr>
+              <a:t>% </a:t>
+            </a:r>
             <a:r>
               <a:rPr lang="en-US" dirty="0" smtClean="0"/>
-              <a:t>Number of unhappy agents</a:t>
+              <a:t>of similar neighbors of an agent</a:t>
+            </a:r>
+          </a:p>
+          <a:p>
+            <a:r>
+              <a:rPr lang="en-US" dirty="0" smtClean="0"/>
+              <a:t>Number of unhappy </a:t>
+            </a:r>
+            <a:r>
+              <a:rPr lang="en-US" dirty="0" smtClean="0"/>
+              <a:t>agents</a:t>
+            </a:r>
+          </a:p>
+          <a:p>
+            <a:r>
+              <a:rPr lang="en-US" dirty="0" smtClean="0"/>
+              <a:t>Ticks to equilibrium</a:t>
             </a:r>
             <a:endParaRPr lang="en-US" dirty="0"/>
           </a:p>
@@ -8676,7 +8740,7 @@
     </p:spTree>
     <p:extLst>
       <p:ext uri="{BB962C8B-B14F-4D97-AF65-F5344CB8AC3E}">
-        <p14:creationId xmlns:p14="http://schemas.microsoft.com/office/powerpoint/2010/main" val="2890700283"/>
+        <p14:creationId xmlns:p14="http://schemas.microsoft.com/office/powerpoint/2010/main" xmlns="" val="2890700283"/>
       </p:ext>
     </p:extLst>
   </p:cSld>
@@ -8737,7 +8801,7 @@
           <p:nvPr>
             <p:extLst>
               <p:ext uri="{D42A27DB-BD31-4B8C-83A1-F6EECF244321}">
-                <p14:modId xmlns:p14="http://schemas.microsoft.com/office/powerpoint/2010/main" val="3717212227"/>
+                <p14:modId xmlns:p14="http://schemas.microsoft.com/office/powerpoint/2010/main" xmlns="" val="3717212227"/>
               </p:ext>
             </p:extLst>
           </p:nvPr>
@@ -8761,7 +8825,7 @@
           <p:nvPr>
             <p:extLst>
               <p:ext uri="{D42A27DB-BD31-4B8C-83A1-F6EECF244321}">
-                <p14:modId xmlns:p14="http://schemas.microsoft.com/office/powerpoint/2010/main" val="2053670861"/>
+                <p14:modId xmlns:p14="http://schemas.microsoft.com/office/powerpoint/2010/main" xmlns="" val="2053670861"/>
               </p:ext>
             </p:extLst>
           </p:nvPr>
@@ -8784,8 +8848,8 @@
         </p:nvSpPr>
         <p:spPr>
           <a:xfrm>
-            <a:off x="3230482" y="5515143"/>
-            <a:ext cx="2531462" cy="861774"/>
+            <a:off x="3034555" y="5623133"/>
+            <a:ext cx="3144853" cy="707886"/>
           </a:xfrm>
           <a:prstGeom prst="rect">
             <a:avLst/>
@@ -8793,7 +8857,7 @@
           <a:noFill/>
         </p:spPr>
         <p:txBody>
-          <a:bodyPr wrap="none" rtlCol="0">
+          <a:bodyPr wrap="square" rtlCol="0" anchor="ctr">
             <a:spAutoFit/>
           </a:bodyPr>
           <a:lstStyle/>
@@ -8810,17 +8874,15 @@
             </a:pPr>
             <a:r>
               <a:rPr lang="en-US" sz="1000" dirty="0" smtClean="0"/>
-              <a:t>60% Old</a:t>
-            </a:r>
-          </a:p>
-          <a:p>
-            <a:pPr marL="742950" lvl="1" indent="-285750">
-              <a:buFont typeface="Arial"/>
-              <a:buChar char="•"/>
-            </a:pPr>
+              <a:t>60% </a:t>
+            </a:r>
             <a:r>
               <a:rPr lang="en-US" sz="1000" dirty="0" smtClean="0"/>
-              <a:t>% Similar Wanted = 65%</a:t>
+              <a:t>Old, % </a:t>
+            </a:r>
+            <a:r>
+              <a:rPr lang="en-US" sz="1000" dirty="0" smtClean="0"/>
+              <a:t>Similar Wanted = 65%</a:t>
             </a:r>
           </a:p>
           <a:p>
@@ -8830,17 +8892,29 @@
             </a:pPr>
             <a:r>
               <a:rPr lang="en-US" sz="1000" dirty="0" smtClean="0"/>
-              <a:t>40% Young</a:t>
-            </a:r>
-          </a:p>
-          <a:p>
-            <a:pPr marL="742950" lvl="1" indent="-285750">
+              <a:t>40% </a:t>
+            </a:r>
+            <a:r>
+              <a:rPr lang="en-US" sz="1000" dirty="0" smtClean="0"/>
+              <a:t>Young, % </a:t>
+            </a:r>
+            <a:r>
+              <a:rPr lang="en-US" sz="1000" dirty="0" smtClean="0"/>
+              <a:t>Similar Wanted = [0 5 100</a:t>
+            </a:r>
+            <a:r>
+              <a:rPr lang="en-US" sz="1000" dirty="0" smtClean="0"/>
+              <a:t>]</a:t>
+            </a:r>
+          </a:p>
+          <a:p>
+            <a:pPr marL="285750" indent="-285750">
               <a:buFont typeface="Arial"/>
               <a:buChar char="•"/>
             </a:pPr>
             <a:r>
               <a:rPr lang="en-US" sz="1000" dirty="0" smtClean="0"/>
-              <a:t>% Similar Wanted = [0 5 100]</a:t>
+              <a:t>Density 85%</a:t>
             </a:r>
             <a:endParaRPr lang="en-US" sz="1000" dirty="0"/>
           </a:p>
@@ -8859,12 +8933,12 @@
         <p:spPr>
           <a:xfrm>
             <a:off x="375212" y="1673917"/>
-            <a:ext cx="8341262" cy="1587334"/>
+            <a:ext cx="8341262" cy="1265836"/>
           </a:xfrm>
         </p:spPr>
         <p:txBody>
           <a:bodyPr>
-            <a:normAutofit fontScale="92500" lnSpcReduction="10000"/>
+            <a:normAutofit/>
           </a:bodyPr>
           <a:lstStyle/>
           <a:p>
@@ -8872,11 +8946,11 @@
               <a:buNone/>
             </a:pPr>
             <a:r>
-              <a:rPr lang="en-US" u="sng" dirty="0" smtClean="0"/>
+              <a:rPr lang="en-US" sz="1800" u="sng" dirty="0" smtClean="0"/>
               <a:t>Results</a:t>
             </a:r>
             <a:r>
-              <a:rPr lang="en-US" dirty="0" smtClean="0"/>
+              <a:rPr lang="en-US" sz="1800" dirty="0" smtClean="0"/>
               <a:t>:</a:t>
             </a:r>
           </a:p>
@@ -8886,16 +8960,33 @@
               <a:buChar char="-"/>
             </a:pPr>
             <a:r>
-              <a:rPr lang="en-US" dirty="0" smtClean="0"/>
-              <a:t>Overall having a younger age group with a lower tolerance increased the happiness level within the community and lowered the time required to reach an equilibrium.</a:t>
-            </a:r>
+              <a:rPr lang="en-US" sz="1800" dirty="0" smtClean="0"/>
+              <a:t>When </a:t>
+            </a:r>
+            <a:r>
+              <a:rPr lang="en-US" sz="1800" dirty="0" smtClean="0"/>
+              <a:t>more tolerant </a:t>
+            </a:r>
+            <a:r>
+              <a:rPr lang="en-US" sz="1800" dirty="0" smtClean="0"/>
+              <a:t>the </a:t>
+            </a:r>
+            <a:r>
+              <a:rPr lang="en-US" sz="1800" dirty="0" smtClean="0"/>
+              <a:t>younger age group </a:t>
+            </a:r>
+            <a:r>
+              <a:rPr lang="en-US" sz="1800" dirty="0" smtClean="0"/>
+              <a:t>can improve the level of integration. But…</a:t>
+            </a:r>
+            <a:endParaRPr lang="en-US" sz="1800" dirty="0" smtClean="0"/>
           </a:p>
         </p:txBody>
       </p:sp>
     </p:spTree>
     <p:extLst>
       <p:ext uri="{BB962C8B-B14F-4D97-AF65-F5344CB8AC3E}">
-        <p14:creationId xmlns:p14="http://schemas.microsoft.com/office/powerpoint/2010/main" val="2372636224"/>
+        <p14:creationId xmlns:p14="http://schemas.microsoft.com/office/powerpoint/2010/main" xmlns="" val="2372636224"/>
       </p:ext>
     </p:extLst>
   </p:cSld>
@@ -8940,7 +9031,7 @@
         </p:spPr>
         <p:txBody>
           <a:bodyPr>
-            <a:normAutofit fontScale="90000"/>
+            <a:normAutofit/>
           </a:bodyPr>
           <a:lstStyle/>
           <a:p>
@@ -9032,7 +9123,7 @@
     </p:spTree>
     <p:extLst>
       <p:ext uri="{BB962C8B-B14F-4D97-AF65-F5344CB8AC3E}">
-        <p14:creationId xmlns:p14="http://schemas.microsoft.com/office/powerpoint/2010/main" val="1858108684"/>
+        <p14:creationId xmlns:p14="http://schemas.microsoft.com/office/powerpoint/2010/main" xmlns="" val="1858108684"/>
       </p:ext>
     </p:extLst>
   </p:cSld>
@@ -9077,7 +9168,7 @@
         </p:spPr>
         <p:txBody>
           <a:bodyPr>
-            <a:normAutofit fontScale="90000"/>
+            <a:normAutofit/>
           </a:bodyPr>
           <a:lstStyle/>
           <a:p>
@@ -9137,7 +9228,7 @@
     </p:spTree>
     <p:extLst>
       <p:ext uri="{BB962C8B-B14F-4D97-AF65-F5344CB8AC3E}">
-        <p14:creationId xmlns:p14="http://schemas.microsoft.com/office/powerpoint/2010/main" val="730276728"/>
+        <p14:creationId xmlns:p14="http://schemas.microsoft.com/office/powerpoint/2010/main" xmlns="" val="730276728"/>
       </p:ext>
     </p:extLst>
   </p:cSld>
@@ -9182,7 +9273,7 @@
         </p:spPr>
         <p:txBody>
           <a:bodyPr>
-            <a:normAutofit fontScale="90000"/>
+            <a:normAutofit/>
           </a:bodyPr>
           <a:lstStyle/>
           <a:p>
@@ -9224,7 +9315,7 @@
     </p:spTree>
     <p:extLst>
       <p:ext uri="{BB962C8B-B14F-4D97-AF65-F5344CB8AC3E}">
-        <p14:creationId xmlns:p14="http://schemas.microsoft.com/office/powerpoint/2010/main" val="673480766"/>
+        <p14:creationId xmlns:p14="http://schemas.microsoft.com/office/powerpoint/2010/main" xmlns="" val="673480766"/>
       </p:ext>
     </p:extLst>
   </p:cSld>
@@ -9287,7 +9378,7 @@
         <p:spPr/>
         <p:txBody>
           <a:bodyPr>
-            <a:normAutofit fontScale="92500" lnSpcReduction="10000"/>
+            <a:normAutofit fontScale="92500" lnSpcReduction="20000"/>
           </a:bodyPr>
           <a:lstStyle/>
           <a:p>
@@ -9374,7 +9465,7 @@
     </p:spTree>
     <p:extLst>
       <p:ext uri="{BB962C8B-B14F-4D97-AF65-F5344CB8AC3E}">
-        <p14:creationId xmlns:p14="http://schemas.microsoft.com/office/powerpoint/2010/main" val="3700015921"/>
+        <p14:creationId xmlns:p14="http://schemas.microsoft.com/office/powerpoint/2010/main" xmlns="" val="3700015921"/>
       </p:ext>
     </p:extLst>
   </p:cSld>

</xml_diff>